<commit_message>
[soutenance] ajt biblio modéle
</commit_message>
<xml_diff>
--- a/soutenances/projet_decembre/diapo_coco.pptx
+++ b/soutenances/projet_decembre/diapo_coco.pptx
@@ -114,7 +114,7 @@
   </p:defaultTextStyle>
   <p:extLst>
     <p:ext uri="{521415D9-36F7-43E2-AB2F-B90AF26B5E84}">
-      <p14:sectionLst xmlns:p14="http://schemas.microsoft.com/office/powerpoint/2010/main">
+      <p14:sectionLst xmlns:p14="http://schemas.microsoft.com/office/powerpoint/2010/main" xmlns="">
         <p14:section name="Modèles INSA" id="{339B715A-A4F6-482F-9E8F-E995A152AF53}">
           <p14:sldIdLst>
             <p14:sldId id="280"/>
@@ -128,7 +128,7 @@
       </p14:sectionLst>
     </p:ext>
     <p:ext uri="{EFAFB233-063F-42B5-8137-9DF3F51BA10A}">
-      <p15:sldGuideLst xmlns:p15="http://schemas.microsoft.com/office/powerpoint/2012/main">
+      <p15:sldGuideLst xmlns:p15="http://schemas.microsoft.com/office/powerpoint/2012/main" xmlns="">
         <p15:guide id="1" orient="horz" pos="2160">
           <p15:clr>
             <a:srgbClr val="A4A3A4"/>
@@ -399,7 +399,7 @@
     </p:spTree>
     <p:extLst>
       <p:ext uri="{BB962C8B-B14F-4D97-AF65-F5344CB8AC3E}">
-        <p14:creationId xmlns:p14="http://schemas.microsoft.com/office/powerpoint/2010/main" val="937745426"/>
+        <p14:creationId xmlns:p14="http://schemas.microsoft.com/office/powerpoint/2010/main" xmlns="" val="937745426"/>
       </p:ext>
     </p:extLst>
   </p:cSld>
@@ -564,6 +564,7 @@
           <a:p>
             <a:fld id="{AB9270AC-FE6D-4237-9CBB-95A5B25BC716}" type="slidenum">
               <a:rPr lang="fr-FR" smtClean="0"/>
+              <a:pPr/>
               <a:t>1</a:t>
             </a:fld>
             <a:endParaRPr lang="fr-FR"/>
@@ -573,7 +574,7 @@
     </p:spTree>
     <p:extLst>
       <p:ext uri="{BB962C8B-B14F-4D97-AF65-F5344CB8AC3E}">
-        <p14:creationId xmlns:p14="http://schemas.microsoft.com/office/powerpoint/2010/main" val="3305065583"/>
+        <p14:creationId xmlns:p14="http://schemas.microsoft.com/office/powerpoint/2010/main" xmlns="" val="3305065583"/>
       </p:ext>
     </p:extLst>
   </p:cSld>
@@ -648,6 +649,7 @@
           <a:p>
             <a:fld id="{AB9270AC-FE6D-4237-9CBB-95A5B25BC716}" type="slidenum">
               <a:rPr lang="fr-FR" smtClean="0"/>
+              <a:pPr/>
               <a:t>2</a:t>
             </a:fld>
             <a:endParaRPr lang="fr-FR"/>
@@ -657,7 +659,7 @@
     </p:spTree>
     <p:extLst>
       <p:ext uri="{BB962C8B-B14F-4D97-AF65-F5344CB8AC3E}">
-        <p14:creationId xmlns:p14="http://schemas.microsoft.com/office/powerpoint/2010/main" val="1252608685"/>
+        <p14:creationId xmlns:p14="http://schemas.microsoft.com/office/powerpoint/2010/main" xmlns="" val="1252608685"/>
       </p:ext>
     </p:extLst>
   </p:cSld>
@@ -756,7 +758,7 @@
             <a:blip r:embed="rId2" cstate="print">
               <a:extLst>
                 <a:ext uri="{28A0092B-C50C-407E-A947-70E740481C1C}">
-                  <a14:useLocalDpi xmlns:a14="http://schemas.microsoft.com/office/drawing/2010/main" val="0"/>
+                  <a14:useLocalDpi xmlns:a14="http://schemas.microsoft.com/office/drawing/2010/main" xmlns="" val="0"/>
                 </a:ext>
               </a:extLst>
             </a:blip>
@@ -774,7 +776,7 @@
             <a:noFill/>
             <a:extLst>
               <a:ext uri="{909E8E84-426E-40DD-AFC4-6F175D3DCCD1}">
-                <a14:hiddenFill xmlns:a14="http://schemas.microsoft.com/office/drawing/2010/main">
+                <a14:hiddenFill xmlns:a14="http://schemas.microsoft.com/office/drawing/2010/main" xmlns="">
                   <a:solidFill>
                     <a:srgbClr val="FFFFFF"/>
                   </a:solidFill>
@@ -795,7 +797,7 @@
             <a:blip r:embed="rId3" cstate="print">
               <a:extLst>
                 <a:ext uri="{28A0092B-C50C-407E-A947-70E740481C1C}">
-                  <a14:useLocalDpi xmlns:a14="http://schemas.microsoft.com/office/drawing/2010/main" val="0"/>
+                  <a14:useLocalDpi xmlns:a14="http://schemas.microsoft.com/office/drawing/2010/main" xmlns="" val="0"/>
                 </a:ext>
               </a:extLst>
             </a:blip>
@@ -815,7 +817,7 @@
             <a:noFill/>
             <a:extLst>
               <a:ext uri="{909E8E84-426E-40DD-AFC4-6F175D3DCCD1}">
-                <a14:hiddenFill xmlns:a14="http://schemas.microsoft.com/office/drawing/2010/main">
+                <a14:hiddenFill xmlns:a14="http://schemas.microsoft.com/office/drawing/2010/main" xmlns="">
                   <a:solidFill>
                     <a:srgbClr val="FFFFFF"/>
                   </a:solidFill>
@@ -1864,7 +1866,7 @@
     </p:spTree>
     <p:extLst>
       <p:ext uri="{BB962C8B-B14F-4D97-AF65-F5344CB8AC3E}">
-        <p14:creationId xmlns:p14="http://schemas.microsoft.com/office/powerpoint/2010/main" val="2155599893"/>
+        <p14:creationId xmlns:p14="http://schemas.microsoft.com/office/powerpoint/2010/main" xmlns="" val="2155599893"/>
       </p:ext>
     </p:extLst>
   </p:cSld>
@@ -2022,7 +2024,7 @@
     </p:spTree>
     <p:extLst>
       <p:ext uri="{BB962C8B-B14F-4D97-AF65-F5344CB8AC3E}">
-        <p14:creationId xmlns:p14="http://schemas.microsoft.com/office/powerpoint/2010/main" val="2625538701"/>
+        <p14:creationId xmlns:p14="http://schemas.microsoft.com/office/powerpoint/2010/main" xmlns="" val="2625538701"/>
       </p:ext>
     </p:extLst>
   </p:cSld>
@@ -2250,7 +2252,7 @@
     </p:spTree>
     <p:extLst>
       <p:ext uri="{BB962C8B-B14F-4D97-AF65-F5344CB8AC3E}">
-        <p14:creationId xmlns:p14="http://schemas.microsoft.com/office/powerpoint/2010/main" val="1505370761"/>
+        <p14:creationId xmlns:p14="http://schemas.microsoft.com/office/powerpoint/2010/main" xmlns="" val="1505370761"/>
       </p:ext>
     </p:extLst>
   </p:cSld>
@@ -2496,7 +2498,7 @@
     </p:spTree>
     <p:extLst>
       <p:ext uri="{BB962C8B-B14F-4D97-AF65-F5344CB8AC3E}">
-        <p14:creationId xmlns:p14="http://schemas.microsoft.com/office/powerpoint/2010/main" val="1601618539"/>
+        <p14:creationId xmlns:p14="http://schemas.microsoft.com/office/powerpoint/2010/main" xmlns="" val="1601618539"/>
       </p:ext>
     </p:extLst>
   </p:cSld>
@@ -2880,7 +2882,7 @@
     </p:spTree>
     <p:extLst>
       <p:ext uri="{BB962C8B-B14F-4D97-AF65-F5344CB8AC3E}">
-        <p14:creationId xmlns:p14="http://schemas.microsoft.com/office/powerpoint/2010/main" val="171255179"/>
+        <p14:creationId xmlns:p14="http://schemas.microsoft.com/office/powerpoint/2010/main" xmlns="" val="171255179"/>
       </p:ext>
     </p:extLst>
   </p:cSld>
@@ -2982,7 +2984,7 @@
     </p:spTree>
     <p:extLst>
       <p:ext uri="{BB962C8B-B14F-4D97-AF65-F5344CB8AC3E}">
-        <p14:creationId xmlns:p14="http://schemas.microsoft.com/office/powerpoint/2010/main" val="4241946124"/>
+        <p14:creationId xmlns:p14="http://schemas.microsoft.com/office/powerpoint/2010/main" xmlns="" val="4241946124"/>
       </p:ext>
     </p:extLst>
   </p:cSld>
@@ -3020,7 +3022,7 @@
     </p:spTree>
     <p:extLst>
       <p:ext uri="{BB962C8B-B14F-4D97-AF65-F5344CB8AC3E}">
-        <p14:creationId xmlns:p14="http://schemas.microsoft.com/office/powerpoint/2010/main" val="3843733788"/>
+        <p14:creationId xmlns:p14="http://schemas.microsoft.com/office/powerpoint/2010/main" xmlns="" val="3843733788"/>
       </p:ext>
     </p:extLst>
   </p:cSld>
@@ -3316,7 +3318,7 @@
     </p:spTree>
     <p:extLst>
       <p:ext uri="{BB962C8B-B14F-4D97-AF65-F5344CB8AC3E}">
-        <p14:creationId xmlns:p14="http://schemas.microsoft.com/office/powerpoint/2010/main" val="680884878"/>
+        <p14:creationId xmlns:p14="http://schemas.microsoft.com/office/powerpoint/2010/main" xmlns="" val="680884878"/>
       </p:ext>
     </p:extLst>
   </p:cSld>
@@ -4365,7 +4367,7 @@
           <a:blip r:embed="rId10" cstate="print">
             <a:extLst>
               <a:ext uri="{28A0092B-C50C-407E-A947-70E740481C1C}">
-                <a14:useLocalDpi xmlns:a14="http://schemas.microsoft.com/office/drawing/2010/main" val="0"/>
+                <a14:useLocalDpi xmlns:a14="http://schemas.microsoft.com/office/drawing/2010/main" xmlns="" val="0"/>
               </a:ext>
             </a:extLst>
           </a:blip>
@@ -4383,7 +4385,7 @@
           <a:noFill/>
           <a:extLst>
             <a:ext uri="{909E8E84-426E-40DD-AFC4-6F175D3DCCD1}">
-              <a14:hiddenFill xmlns:a14="http://schemas.microsoft.com/office/drawing/2010/main">
+              <a14:hiddenFill xmlns:a14="http://schemas.microsoft.com/office/drawing/2010/main" xmlns="">
                 <a:solidFill>
                   <a:srgbClr val="FFFFFF"/>
                 </a:solidFill>
@@ -4404,7 +4406,7 @@
           <a:blip r:embed="rId11" cstate="print">
             <a:extLst>
               <a:ext uri="{28A0092B-C50C-407E-A947-70E740481C1C}">
-                <a14:useLocalDpi xmlns:a14="http://schemas.microsoft.com/office/drawing/2010/main" val="0"/>
+                <a14:useLocalDpi xmlns:a14="http://schemas.microsoft.com/office/drawing/2010/main" xmlns="" val="0"/>
               </a:ext>
             </a:extLst>
           </a:blip>
@@ -4424,7 +4426,7 @@
           <a:noFill/>
           <a:extLst>
             <a:ext uri="{909E8E84-426E-40DD-AFC4-6F175D3DCCD1}">
-              <a14:hiddenFill xmlns:a14="http://schemas.microsoft.com/office/drawing/2010/main">
+              <a14:hiddenFill xmlns:a14="http://schemas.microsoft.com/office/drawing/2010/main" xmlns="">
                 <a:solidFill>
                   <a:srgbClr val="FFFFFF"/>
                 </a:solidFill>
@@ -4582,7 +4584,7 @@
             <a:lum bright="70000" contrast="-70000"/>
             <a:extLst>
               <a:ext uri="{28A0092B-C50C-407E-A947-70E740481C1C}">
-                <a14:useLocalDpi xmlns:a14="http://schemas.microsoft.com/office/drawing/2010/main" val="0"/>
+                <a14:useLocalDpi xmlns:a14="http://schemas.microsoft.com/office/drawing/2010/main" xmlns="" val="0"/>
               </a:ext>
             </a:extLst>
           </a:blip>
@@ -4603,7 +4605,7 @@
     </p:spTree>
     <p:extLst>
       <p:ext uri="{BB962C8B-B14F-4D97-AF65-F5344CB8AC3E}">
-        <p14:creationId xmlns:p14="http://schemas.microsoft.com/office/powerpoint/2010/main" val="3080300347"/>
+        <p14:creationId xmlns:p14="http://schemas.microsoft.com/office/powerpoint/2010/main" xmlns="" val="3080300347"/>
       </p:ext>
     </p:extLst>
   </p:cSld>
@@ -4913,7 +4915,7 @@
           <a:blip r:embed="rId3" cstate="print">
             <a:extLst>
               <a:ext uri="{28A0092B-C50C-407E-A947-70E740481C1C}">
-                <a14:useLocalDpi xmlns:a14="http://schemas.microsoft.com/office/drawing/2010/main" val="0"/>
+                <a14:useLocalDpi xmlns:a14="http://schemas.microsoft.com/office/drawing/2010/main" xmlns="" val="0"/>
               </a:ext>
             </a:extLst>
           </a:blip>
@@ -5013,18 +5015,18 @@
     </p:spTree>
     <p:extLst>
       <p:ext uri="{BB962C8B-B14F-4D97-AF65-F5344CB8AC3E}">
-        <p14:creationId xmlns:p14="http://schemas.microsoft.com/office/powerpoint/2010/main" val="1433429"/>
+        <p14:creationId xmlns:p14="http://schemas.microsoft.com/office/powerpoint/2010/main" xmlns="" val="1433429"/>
       </p:ext>
     </p:extLst>
   </p:cSld>
   <p:clrMapOvr>
     <a:masterClrMapping/>
   </p:clrMapOvr>
-  <mc:AlternateContent xmlns:mc="http://schemas.openxmlformats.org/markup-compatibility/2006" xmlns:p14="http://schemas.microsoft.com/office/powerpoint/2010/main">
-    <mc:Choice Requires="p14">
+  <mc:AlternateContent xmlns:mc="http://schemas.openxmlformats.org/markup-compatibility/2006">
+    <mc:Choice xmlns:p14="http://schemas.microsoft.com/office/powerpoint/2010/main" xmlns="" Requires="p14">
       <p:transition p14:dur="10"/>
     </mc:Choice>
-    <mc:Fallback xmlns="">
+    <mc:Fallback>
       <p:transition/>
     </mc:Fallback>
   </mc:AlternateContent>
@@ -5069,7 +5071,7 @@
           <a:blip r:embed="rId3" cstate="print">
             <a:extLst>
               <a:ext uri="{28A0092B-C50C-407E-A947-70E740481C1C}">
-                <a14:useLocalDpi xmlns:a14="http://schemas.microsoft.com/office/drawing/2010/main" val="0"/>
+                <a14:useLocalDpi xmlns:a14="http://schemas.microsoft.com/office/drawing/2010/main" xmlns="" val="0"/>
               </a:ext>
             </a:extLst>
           </a:blip>
@@ -5179,7 +5181,7 @@
           <a:blip r:embed="rId4" cstate="print">
             <a:extLst>
               <a:ext uri="{28A0092B-C50C-407E-A947-70E740481C1C}">
-                <a14:useLocalDpi xmlns:a14="http://schemas.microsoft.com/office/drawing/2010/main" val="0"/>
+                <a14:useLocalDpi xmlns:a14="http://schemas.microsoft.com/office/drawing/2010/main" xmlns="" val="0"/>
               </a:ext>
             </a:extLst>
           </a:blip>
@@ -5230,20 +5232,20 @@
     </p:spTree>
     <p:extLst>
       <p:ext uri="{BB962C8B-B14F-4D97-AF65-F5344CB8AC3E}">
-        <p14:creationId xmlns:p14="http://schemas.microsoft.com/office/powerpoint/2010/main" val="2053331608"/>
+        <p14:creationId xmlns:p14="http://schemas.microsoft.com/office/powerpoint/2010/main" xmlns="" val="2053331608"/>
       </p:ext>
     </p:extLst>
   </p:cSld>
   <p:clrMapOvr>
     <a:masterClrMapping/>
   </p:clrMapOvr>
-  <mc:AlternateContent xmlns:mc="http://schemas.openxmlformats.org/markup-compatibility/2006" xmlns:p14="http://schemas.microsoft.com/office/powerpoint/2010/main">
-    <mc:Choice Requires="p14">
+  <mc:AlternateContent xmlns:mc="http://schemas.openxmlformats.org/markup-compatibility/2006">
+    <mc:Choice xmlns:p14="http://schemas.microsoft.com/office/powerpoint/2010/main" xmlns="" Requires="p14">
       <p:transition spd="med" p14:dur="700">
         <p:fade/>
       </p:transition>
     </mc:Choice>
-    <mc:Fallback xmlns="">
+    <mc:Fallback>
       <p:transition spd="med">
         <p:fade/>
       </p:transition>
@@ -5600,7 +5602,6 @@
               <a:rPr lang="fr-FR" sz="2400" dirty="0" smtClean="0"/>
               <a:t>.</a:t>
             </a:r>
-            <a:endParaRPr lang="fr-FR" sz="2400" dirty="0" smtClean="0"/>
           </a:p>
         </p:txBody>
       </p:sp>
@@ -5644,7 +5645,7 @@
         </p:nvSpPr>
         <p:spPr>
           <a:xfrm>
-            <a:off x="4716016" y="4815140"/>
+            <a:off x="4644008" y="4941168"/>
             <a:ext cx="4752528" cy="738664"/>
           </a:xfrm>
           <a:prstGeom prst="rect">
@@ -5680,7 +5681,7 @@
           <a:blip r:embed="rId2" cstate="print">
             <a:extLst>
               <a:ext uri="{28A0092B-C50C-407E-A947-70E740481C1C}">
-                <a14:useLocalDpi xmlns:a14="http://schemas.microsoft.com/office/drawing/2010/main" val="0"/>
+                <a14:useLocalDpi xmlns:a14="http://schemas.microsoft.com/office/drawing/2010/main" xmlns="" val="0"/>
               </a:ext>
             </a:extLst>
           </a:blip>
@@ -5697,42 +5698,34 @@
           </a:prstGeom>
         </p:spPr>
       </p:pic>
-      <p:sp>
-        <p:nvSpPr>
-          <p:cNvPr id="9" name="ZoneTexte 8"/>
-          <p:cNvSpPr txBox="1"/>
+      <p:pic>
+        <p:nvPicPr>
+          <p:cNvPr id="10" name="Image 9" descr="ex_modele.png"/>
+          <p:cNvPicPr>
+            <a:picLocks noChangeAspect="1"/>
+          </p:cNvPicPr>
           <p:nvPr/>
-        </p:nvSpPr>
+        </p:nvPicPr>
+        <p:blipFill>
+          <a:blip r:embed="rId3" cstate="print"/>
+          <a:stretch>
+            <a:fillRect/>
+          </a:stretch>
+        </p:blipFill>
         <p:spPr>
           <a:xfrm>
-            <a:off x="5220072" y="2934809"/>
-            <a:ext cx="3466339" cy="646331"/>
+            <a:off x="4499992" y="1844824"/>
+            <a:ext cx="4049774" cy="2841878"/>
           </a:xfrm>
           <a:prstGeom prst="rect">
             <a:avLst/>
           </a:prstGeom>
-          <a:noFill/>
         </p:spPr>
-        <p:txBody>
-          <a:bodyPr wrap="square" rtlCol="0">
-            <a:spAutoFit/>
-          </a:bodyPr>
-          <a:lstStyle/>
-          <a:p>
-            <a:r>
-              <a:rPr lang="fr-FR" dirty="0" smtClean="0"/>
-              <a:t>Mettre ici arbre typique</a:t>
-            </a:r>
-          </a:p>
-          <a:p>
-            <a:endParaRPr lang="fr-FR" dirty="0"/>
-          </a:p>
-        </p:txBody>
-      </p:sp>
+      </p:pic>
     </p:spTree>
     <p:extLst>
       <p:ext uri="{BB962C8B-B14F-4D97-AF65-F5344CB8AC3E}">
-        <p14:creationId xmlns:p14="http://schemas.microsoft.com/office/powerpoint/2010/main" val="2992677937"/>
+        <p14:creationId xmlns:p14="http://schemas.microsoft.com/office/powerpoint/2010/main" xmlns="" val="2992677937"/>
       </p:ext>
     </p:extLst>
   </p:cSld>
@@ -5847,10 +5840,10 @@
           <p:nvPr/>
         </p:nvPicPr>
         <p:blipFill>
-          <a:blip r:embed="rId2">
+          <a:blip r:embed="rId2" cstate="print">
             <a:extLst>
               <a:ext uri="{28A0092B-C50C-407E-A947-70E740481C1C}">
-                <a14:useLocalDpi xmlns:a14="http://schemas.microsoft.com/office/drawing/2010/main" val="0"/>
+                <a14:useLocalDpi xmlns:a14="http://schemas.microsoft.com/office/drawing/2010/main" xmlns="" val="0"/>
               </a:ext>
             </a:extLst>
           </a:blip>
@@ -5871,7 +5864,7 @@
     </p:spTree>
     <p:extLst>
       <p:ext uri="{BB962C8B-B14F-4D97-AF65-F5344CB8AC3E}">
-        <p14:creationId xmlns:p14="http://schemas.microsoft.com/office/powerpoint/2010/main" val="3871753629"/>
+        <p14:creationId xmlns:p14="http://schemas.microsoft.com/office/powerpoint/2010/main" xmlns="" val="3871753629"/>
       </p:ext>
     </p:extLst>
   </p:cSld>
@@ -5946,7 +5939,7 @@
           <a:blip r:embed="rId2" cstate="print">
             <a:extLst>
               <a:ext uri="{28A0092B-C50C-407E-A947-70E740481C1C}">
-                <a14:useLocalDpi xmlns:a14="http://schemas.microsoft.com/office/drawing/2010/main" val="0"/>
+                <a14:useLocalDpi xmlns:a14="http://schemas.microsoft.com/office/drawing/2010/main" xmlns="" val="0"/>
               </a:ext>
             </a:extLst>
           </a:blip>
@@ -6161,16 +6154,7 @@
                   <a:schemeClr val="accent3"/>
                 </a:solidFill>
               </a:rPr>
-              <a:t>Une </a:t>
-            </a:r>
-            <a:r>
-              <a:rPr lang="fr-FR" b="1" dirty="0" smtClean="0">
-                <a:ln/>
-                <a:solidFill>
-                  <a:schemeClr val="accent3"/>
-                </a:solidFill>
-              </a:rPr>
-              <a:t>représentation textuelle</a:t>
+              <a:t>Une représentation textuelle</a:t>
             </a:r>
             <a:endParaRPr lang="fr-FR" b="1" dirty="0">
               <a:ln/>
@@ -6320,19 +6304,13 @@
               </a:rPr>
               <a:t>textuelle</a:t>
             </a:r>
-            <a:endParaRPr lang="fr-FR" b="1" dirty="0">
-              <a:ln/>
-              <a:solidFill>
-                <a:schemeClr val="accent3"/>
-              </a:solidFill>
-            </a:endParaRPr>
           </a:p>
         </p:txBody>
       </p:sp>
     </p:spTree>
     <p:extLst>
       <p:ext uri="{BB962C8B-B14F-4D97-AF65-F5344CB8AC3E}">
-        <p14:creationId xmlns:p14="http://schemas.microsoft.com/office/powerpoint/2010/main" val="3707253623"/>
+        <p14:creationId xmlns:p14="http://schemas.microsoft.com/office/powerpoint/2010/main" xmlns="" val="3707253623"/>
       </p:ext>
     </p:extLst>
   </p:cSld>
@@ -6715,7 +6693,6 @@
               <a:rPr lang="fr-FR" dirty="0" smtClean="0"/>
               <a:t>.</a:t>
             </a:r>
-            <a:endParaRPr lang="fr-FR" dirty="0" smtClean="0"/>
           </a:p>
         </p:txBody>
       </p:sp>
@@ -6827,10 +6804,10 @@
           <p:nvPr/>
         </p:nvPicPr>
         <p:blipFill>
-          <a:blip r:embed="rId2">
+          <a:blip r:embed="rId2" cstate="print">
             <a:extLst>
               <a:ext uri="{28A0092B-C50C-407E-A947-70E740481C1C}">
-                <a14:useLocalDpi xmlns:a14="http://schemas.microsoft.com/office/drawing/2010/main" val="0"/>
+                <a14:useLocalDpi xmlns:a14="http://schemas.microsoft.com/office/drawing/2010/main" xmlns="" val="0"/>
               </a:ext>
             </a:extLst>
           </a:blip>
@@ -6850,7 +6827,7 @@
           <a:noFill/>
           <a:extLst>
             <a:ext uri="{909E8E84-426E-40DD-AFC4-6F175D3DCCD1}">
-              <a14:hiddenFill xmlns:a14="http://schemas.microsoft.com/office/drawing/2010/main">
+              <a14:hiddenFill xmlns:a14="http://schemas.microsoft.com/office/drawing/2010/main" xmlns="">
                 <a:solidFill>
                   <a:srgbClr val="FFFFFF"/>
                 </a:solidFill>
@@ -6862,7 +6839,7 @@
     </p:spTree>
     <p:extLst>
       <p:ext uri="{BB962C8B-B14F-4D97-AF65-F5344CB8AC3E}">
-        <p14:creationId xmlns:p14="http://schemas.microsoft.com/office/powerpoint/2010/main" val="3685594"/>
+        <p14:creationId xmlns:p14="http://schemas.microsoft.com/office/powerpoint/2010/main" xmlns="" val="3685594"/>
       </p:ext>
     </p:extLst>
   </p:cSld>

</xml_diff>